<commit_message>
2º versão do PITCH com logo adicionada
</commit_message>
<xml_diff>
--- a/PastaDocumentos/PITCH.pptx
+++ b/PastaDocumentos/PITCH.pptx
@@ -104,7 +104,309 @@
       </a:defRPr>
     </a:lvl9pPr>
   </p:defaultTextStyle>
+  <p:extLst>
+    <p:ext uri="{EFAFB233-063F-42B5-8137-9DF3F51BA10A}">
+      <p15:sldGuideLst xmlns:p15="http://schemas.microsoft.com/office/powerpoint/2012/main"/>
+    </p:ext>
+  </p:extLst>
 </p:presentation>
+</file>
+
+<file path=ppt/ink/ink1.xml><?xml version="1.0" encoding="utf-8"?>
+<inkml:ink xmlns:inkml="http://www.w3.org/2003/InkML">
+  <inkml:definitions>
+    <inkml:context xml:id="ctx0">
+      <inkml:inkSource xml:id="inkSrc0">
+        <inkml:traceFormat>
+          <inkml:channel name="X" type="integer" min="-2.14748E9" max="2.14748E9" units="cm"/>
+          <inkml:channel name="Y" type="integer" min="-2.14748E9" max="2.14748E9" units="cm"/>
+        </inkml:traceFormat>
+        <inkml:channelProperties>
+          <inkml:channelProperty channel="X" name="resolution" value="1000" units="1/cm"/>
+          <inkml:channelProperty channel="Y" name="resolution" value="1000" units="1/cm"/>
+        </inkml:channelProperties>
+      </inkml:inkSource>
+      <inkml:timestamp xml:id="ts0" timeString="2024-03-20T01:32:33.502"/>
+    </inkml:context>
+    <inkml:brush xml:id="br0">
+      <inkml:brushProperty name="width" value="0.05" units="cm"/>
+      <inkml:brushProperty name="height" value="0.05" units="cm"/>
+      <inkml:brushProperty name="color" value="#E71224"/>
+      <inkml:brushProperty name="ignorePressure" value="1"/>
+    </inkml:brush>
+  </inkml:definitions>
+  <inkml:trace contextRef="#ctx0" brushRef="#br0">399 72,'-2'44,"-3"0,-2 0,-2 0,-16 48,1-2,-68 275,-67 286,103-344,46-229,1 148,9-214,0 0,2 0,-1 0,2 0,-1 0,2-1,4 13,-6-20,0 0,0-1,0 1,0-1,1 0,-1 0,1 0,0 0,0 0,0 0,0-1,1 1,-1-1,0 0,1 0,0 0,-1-1,1 1,0-1,0 0,0 0,0 0,0-1,5 1,7-1,-1-1,1-1,-1 0,0-1,0-1,0 0,0-1,15-7,116-64,-75 35,-2-4,-2-2,-3-3,91-91,-129 115,-2-2,0-1,-2-1,-1 0,-2-2,-1 0,-2-1,0-1,-3-1,-1 0,-1 0,8-54,-11-11,-5 1,-11-131,-1 22,7 183,-1 0,-1 1,-1-1,-1 1,-1 1,-1-1,-1 1,-1 0,-1 1,-1 1,-1-1,-29-34,28 35,0-1,1-1,-9-24,15 31,0-1,-1 2,-1-1,-1 1,0 0,0 1,-2 1,-22-23,22 27,0 0,0 0,-1 1,-1 1,1 0,-1 1,0 1,-20-6,29 10,-1-1,1 2,-1-1,0 0,1 1,-1 0,0 1,1-1,-1 1,1 0,-1 0,1 1,-1 0,1 0,0 0,-1 0,1 1,1 0,-1 0,0 0,1 1,-1-1,1 1,0 0,-4 6,-18 28,1 1,2 1,2 1,-30 85,36-83</inkml:trace>
+</inkml:ink>
+</file>
+
+<file path=ppt/ink/ink10.xml><?xml version="1.0" encoding="utf-8"?>
+<inkml:ink xmlns:inkml="http://www.w3.org/2003/InkML">
+  <inkml:definitions>
+    <inkml:context xml:id="ctx0">
+      <inkml:inkSource xml:id="inkSrc0">
+        <inkml:traceFormat>
+          <inkml:channel name="X" type="integer" min="-2.14748E9" max="2.14748E9" units="cm"/>
+          <inkml:channel name="Y" type="integer" min="-2.14748E9" max="2.14748E9" units="cm"/>
+        </inkml:traceFormat>
+        <inkml:channelProperties>
+          <inkml:channelProperty channel="X" name="resolution" value="1000" units="1/cm"/>
+          <inkml:channelProperty channel="Y" name="resolution" value="1000" units="1/cm"/>
+        </inkml:channelProperties>
+      </inkml:inkSource>
+      <inkml:timestamp xml:id="ts0" timeString="2024-03-20T01:32:47.658"/>
+    </inkml:context>
+    <inkml:brush xml:id="br0">
+      <inkml:brushProperty name="width" value="0.05" units="cm"/>
+      <inkml:brushProperty name="height" value="0.05" units="cm"/>
+      <inkml:brushProperty name="color" value="#E71224"/>
+      <inkml:brushProperty name="ignorePressure" value="1"/>
+    </inkml:brush>
+  </inkml:definitions>
+  <inkml:trace contextRef="#ctx0" brushRef="#br0">103 7,'0'0,"0"0,1 0,-1-1,0 1,0 0,0 0,0-1,0 1,0 0,0 0,0 0,-1-1,1 1,0 0,0 0,0 0,0-1,0 1,0 0,0 0,0 0,0 0,-1-1,1 1,0 0,0 0,0 0,0 0,-1 0,1-1,0 1,0 0,0 0,-1 0,1 0,0 0,0 0,0 0,-1 0,1 0,0 0,-1 0,-10 5,-10 14,14-9,0-1,0 1,1 0,0 0,0 1,2 0,-1 0,1 0,1 0,0 1,1-1,0 1,-1 19,2-23,1 1,0-1,1 1,0-1,0 0,1 1,0-1,0 0,1 0,0 0,0 0,1 0,0-1,0 1,1-1,0 0,0-1,1 1,9 8,6 0,0-1,1-2,0 0,1-1,0-1,1-1,0-1,0-1,1-1,0-2,0 0,49 0,-66-5,-1 1,0-2,1 1,-1-1,0 0,0-1,0 0,0 0,0 0,-1-1,1 0,-1 0,0-1,0 1,-1-1,0-1,1 1,-2-1,1 0,-1 0,1 0,-2-1,1 1,-1-1,0 0,0 0,-1 0,0 0,0-1,-1 1,0 0,0-1,-1 1,0-13,-1 17,1 0,0 0,-1 0,0 0,0 0,0 0,0 0,0 0,-1 0,1 1,-1-1,0 0,0 1,0-1,0 1,0 0,-5-4,0 2,1 0,-1 1,0-1,0 2,-12-4,12 4,0 0,1-1,-1 1,0-1,1-1,-8-5,13 9,1-1,-1 1,1-1,-1 1,1-1,-1 0,1 1,0-1,0 0,-1 1,1-1,0 0,0 1,0-1,0 0,-1 1,1-1,0 0,0 0,0 1,1-1,-1 0,0 1,0-1,0 0,1 1,-1-1,0 0,0 1,1-1,-1 0,1 1,-1-1,0 1,1-1,-1 1,1-1,0 1,-1-1,1 1,-1-1,1 1,0 0,-1-1,2 1,37-23,-34 21,157-87,-113 58</inkml:trace>
+</inkml:ink>
+</file>
+
+<file path=ppt/ink/ink11.xml><?xml version="1.0" encoding="utf-8"?>
+<inkml:ink xmlns:inkml="http://www.w3.org/2003/InkML">
+  <inkml:definitions>
+    <inkml:context xml:id="ctx0">
+      <inkml:inkSource xml:id="inkSrc0">
+        <inkml:traceFormat>
+          <inkml:channel name="X" type="integer" min="-2.14748E9" max="2.14748E9" units="cm"/>
+          <inkml:channel name="Y" type="integer" min="-2.14748E9" max="2.14748E9" units="cm"/>
+        </inkml:traceFormat>
+        <inkml:channelProperties>
+          <inkml:channelProperty channel="X" name="resolution" value="1000" units="1/cm"/>
+          <inkml:channelProperty channel="Y" name="resolution" value="1000" units="1/cm"/>
+        </inkml:channelProperties>
+      </inkml:inkSource>
+      <inkml:timestamp xml:id="ts0" timeString="2024-03-20T01:32:48.678"/>
+    </inkml:context>
+    <inkml:brush xml:id="br0">
+      <inkml:brushProperty name="width" value="0.05" units="cm"/>
+      <inkml:brushProperty name="height" value="0.05" units="cm"/>
+      <inkml:brushProperty name="color" value="#E71224"/>
+      <inkml:brushProperty name="ignorePressure" value="1"/>
+    </inkml:brush>
+  </inkml:definitions>
+  <inkml:trace contextRef="#ctx0" brushRef="#br0">131 282,'-1'95,"3"106,-1-197,-1 0,1 0,0 1,0-1,0 0,1 0,-1 0,1 0,0 0,0-1,1 1,-1 0,1-1,0 0,0 1,0-1,0-1,0 1,1 0,-1-1,1 1,-1-1,1 0,0 0,0-1,0 1,8 1,9 2,0-1,0-1,1-1,27-1,-35 0,5-1,15 2,1-2,-1-1,0-2,43-9,-69 10,0 0,1 0,-1-1,0 0,-1-1,1 0,-1 0,1-1,-1 0,-1 0,1 0,-1-1,0 0,0 0,0-1,-1 0,0 0,0 0,-1 0,0-1,0 0,3-11,0-5,-1 1,-1-1,-2 0,0-1,-1 1,-2-1,-3-36,2 44,-2 1,0-1,-1 1,0 0,-2 0,0 1,0 0,-2 0,1 0,-2 1,-18-24,17 28,0 1,-1 1,0 0,0 1,0 0,-1 0,0 1,-1 1,1 0,-1 1,0 0,0 1,-24-3,-11 1,-1 2,-68 4,94 0,0 0,0 2,0 1,-35 11,50-12,0-1,1 1,0 1,-1 0,1 0,0 0,1 1,-1 0,1 0,0 0,0 1,1 0,-1 0,2 1,-1-1,-6 12,-1 15</inkml:trace>
+</inkml:ink>
+</file>
+
+<file path=ppt/ink/ink2.xml><?xml version="1.0" encoding="utf-8"?>
+<inkml:ink xmlns:inkml="http://www.w3.org/2003/InkML">
+  <inkml:definitions>
+    <inkml:context xml:id="ctx0">
+      <inkml:inkSource xml:id="inkSrc0">
+        <inkml:traceFormat>
+          <inkml:channel name="X" type="integer" min="-2.14748E9" max="2.14748E9" units="cm"/>
+          <inkml:channel name="Y" type="integer" min="-2.14748E9" max="2.14748E9" units="cm"/>
+        </inkml:traceFormat>
+        <inkml:channelProperties>
+          <inkml:channelProperty channel="X" name="resolution" value="1000" units="1/cm"/>
+          <inkml:channelProperty channel="Y" name="resolution" value="1000" units="1/cm"/>
+        </inkml:channelProperties>
+      </inkml:inkSource>
+      <inkml:timestamp xml:id="ts0" timeString="2024-03-20T01:32:34.976"/>
+    </inkml:context>
+    <inkml:brush xml:id="br0">
+      <inkml:brushProperty name="width" value="0.05" units="cm"/>
+      <inkml:brushProperty name="height" value="0.05" units="cm"/>
+      <inkml:brushProperty name="color" value="#E71224"/>
+      <inkml:brushProperty name="ignorePressure" value="1"/>
+    </inkml:brush>
+  </inkml:definitions>
+  <inkml:trace contextRef="#ctx0" brushRef="#br0">1778 317,'-26'-25,"-127"-113,132 122,-1 1,0 1,-1 1,-1 1,-44-16,16 13,0 2,-1 3,-106-8,-163 20,280 0,0 1,0 2,0 2,1 2,0 2,0 2,1 1,1 2,0 2,2 1,0 2,-54 41,91-62,-26 19,2 1,0 1,1 2,-37 46,56-64,0 0,1 1,-1-1,1 1,1 0,-1 0,1 0,0 0,0 1,1-1,0 0,0 1,0-1,1 1,0-1,0 1,0-1,1 1,0-1,1 0,-1 1,1-1,1 0,-1 0,1 0,0 0,0-1,0 1,1-1,6 7,3 2,0-1,1-1,1 0,0-1,0 0,1-1,0-1,1-1,0 0,35 10,-26-10,0-2,0 0,1-2,-1-1,1-2,50-2,-49-4,-28 5,0-1,0 1,0 0,0 0,0 0,0 0,0-1,0 1,0 0,0 0,0 0,0 0,0-1,0 1,0 0,0 0,0 0,0 0,0-1,0 1,0 0,0 0,0 0,0 0,0-1,0 1,-1 0,1 0,0 0,0 0,0-1,0 1,0 0,0 0,-1 0,1 0,0 0,0 0,0 0,0 0,-1 0,1-1,0 1,0 0,0 0,0 0,-1 0,1 0,0 0,0 0,0 0,0 0,-1 0,1 0,0 0,0 1,-1-1,-50-9,18 5,-5-1,-1 2,1 1,-1 2,1 2,-76 13,108-14,-1 1,1 0,-1 1,1 0,0 0,0 0,0 0,0 1,1 0,0 1,-1-1,1 1,1 0,-1 0,1 0,0 1,0-1,1 1,-1 0,1 0,0 1,1-1,0 1,0-1,0 1,1-1,0 1,0 0,1 12,-3 95,19 171,-14-265,1-1,1 0,1 0,1-1,0 1,1-1,1 0,1-1,1 0,0-1,15 19,-1-6,2-1,1-1,1-1,55 39,-65-54,0-1,1 0,-1-1,2-1,-1-1,1-1,1-1,-1 0,37 2,16-2,105-7,-105-1,-51 2,1-1,-1-2,0 0,0-1,-1-1,1-1,-1 0,-1-2,1-1,-2 0,1-2,27-21,33-21,-47 35</inkml:trace>
+</inkml:ink>
+</file>
+
+<file path=ppt/ink/ink3.xml><?xml version="1.0" encoding="utf-8"?>
+<inkml:ink xmlns:inkml="http://www.w3.org/2003/InkML">
+  <inkml:definitions>
+    <inkml:context xml:id="ctx0">
+      <inkml:inkSource xml:id="inkSrc0">
+        <inkml:traceFormat>
+          <inkml:channel name="X" type="integer" min="-2.14748E9" max="2.14748E9" units="cm"/>
+          <inkml:channel name="Y" type="integer" min="-2.14748E9" max="2.14748E9" units="cm"/>
+        </inkml:traceFormat>
+        <inkml:channelProperties>
+          <inkml:channelProperty channel="X" name="resolution" value="1000" units="1/cm"/>
+          <inkml:channelProperty channel="Y" name="resolution" value="1000" units="1/cm"/>
+        </inkml:channelProperties>
+      </inkml:inkSource>
+      <inkml:timestamp xml:id="ts0" timeString="2024-03-20T01:32:36.583"/>
+    </inkml:context>
+    <inkml:brush xml:id="br0">
+      <inkml:brushProperty name="width" value="0.05" units="cm"/>
+      <inkml:brushProperty name="height" value="0.05" units="cm"/>
+      <inkml:brushProperty name="color" value="#E71224"/>
+      <inkml:brushProperty name="ignorePressure" value="1"/>
+    </inkml:brush>
+  </inkml:definitions>
+  <inkml:trace contextRef="#ctx0" brushRef="#br0">395 436,'24'-22,"0"1,2 2,0 0,1 2,38-19,154-56,-44 20,-104 38,74-32,-123 58,1 1,0 1,1 0,39-3,-51 8,0 0,0 1,0 1,1-1,-1 2,0 0,17 5,-25-6,0 1,0 0,0 0,0 1,0-1,-1 1,1 0,-1 0,1 0,-1 0,0 0,0 1,-1 0,1-1,-1 1,1 0,-1 0,-1 1,1-1,0 0,-1 1,0-1,1 5,10 62,-2 0,0 132,-12-183,0-1,-1 0,-1 0,-1 0,-1 0,-1-1,0 1,-1-2,-1 1,-1-1,0-1,-1 0,-1 0,-19 19,-5 3,-3-2,0-2,-3-2,-52 32,68-47,-1-3,0 0,-1-1,-34 9,48-17,-1-1,1-1,-1 0,0-1,0-1,0 0,0-1,0 0,0-2,-19-3,11-5,23 9,0 1,0 0,0-1,0 1,0 0,-1-1,1 1,0 0,0-1,0 1,0 0,0-1,0 1,0 0,0-1,0 1,1 0,-1-1,0 1,0 0,0 0,0-1,0 1,1 0,-1-1,0 1,0 0,0 0,1-1,-1 1,0 0,0 0,1 0,-1-1,0 1,1 0,3-2,0 0,0 0,0 0,0 0,1 1,-1 0,9-1,5-1,0 1,1 1,-1 0,1 2,-1 0,0 1,25 6,-37-7,0 1,0 0,0 1,0 0,0 0,-1 0,1 0,-1 1,0 0,0 0,0 0,-1 1,1 0,-1 0,0 0,-1 0,1 1,-1-1,0 1,0 0,-1 0,0 0,0 0,2 8,1 24,-2 1,-1-1,-2 1,-2-1,-7 43,8-69,-1-1,-1 1,0-1,0 0,-1 0,0 0,-1-1,-1 1,0-1,0 0,0-1,-1 1,-1-1,0-1,0 0,-1 0,1 0,-2-1,1 0,-1-1,0 0,-11 4,-4 1,-1-1,0-2,0 0,-1-2,1-1,-2-1,1-1,-38-2,-530-9,589 8,0 0,-1 0,1-1,0 0,0 0,0 0,0-1,-10-3,14 3,-1 0,0 0,0 0,1 0,-1 0,1-1,-1 1,1-1,0 0,0 1,0-1,0 0,1 0,-1 0,1-1,0 1,-1-3,-6-27</inkml:trace>
+</inkml:ink>
+</file>
+
+<file path=ppt/ink/ink4.xml><?xml version="1.0" encoding="utf-8"?>
+<inkml:ink xmlns:inkml="http://www.w3.org/2003/InkML">
+  <inkml:definitions>
+    <inkml:context xml:id="ctx0">
+      <inkml:inkSource xml:id="inkSrc0">
+        <inkml:traceFormat>
+          <inkml:channel name="X" type="integer" min="-2.14748E9" max="2.14748E9" units="cm"/>
+          <inkml:channel name="Y" type="integer" min="-2.14748E9" max="2.14748E9" units="cm"/>
+        </inkml:traceFormat>
+        <inkml:channelProperties>
+          <inkml:channelProperty channel="X" name="resolution" value="1000" units="1/cm"/>
+          <inkml:channelProperty channel="Y" name="resolution" value="1000" units="1/cm"/>
+        </inkml:channelProperties>
+      </inkml:inkSource>
+      <inkml:timestamp xml:id="ts0" timeString="2024-03-20T01:32:37.402"/>
+    </inkml:context>
+    <inkml:brush xml:id="br0">
+      <inkml:brushProperty name="width" value="0.05" units="cm"/>
+      <inkml:brushProperty name="height" value="0.05" units="cm"/>
+      <inkml:brushProperty name="color" value="#E71224"/>
+      <inkml:brushProperty name="ignorePressure" value="1"/>
+    </inkml:brush>
+  </inkml:definitions>
+  <inkml:trace contextRef="#ctx0" brushRef="#br0">2 1366,'-1'-132,"4"-175,3 250,3-1,1 1,4 1,2 0,29-70,-13 54,2 2,4 1,64-89,-92 142,1 1,1 1,0-1,1 2,0 0,1 1,0 0,20-12,-6 10</inkml:trace>
+</inkml:ink>
+</file>
+
+<file path=ppt/ink/ink5.xml><?xml version="1.0" encoding="utf-8"?>
+<inkml:ink xmlns:inkml="http://www.w3.org/2003/InkML">
+  <inkml:definitions>
+    <inkml:context xml:id="ctx0">
+      <inkml:inkSource xml:id="inkSrc0">
+        <inkml:traceFormat>
+          <inkml:channel name="X" type="integer" min="-2.14748E9" max="2.14748E9" units="cm"/>
+          <inkml:channel name="Y" type="integer" min="-2.14748E9" max="2.14748E9" units="cm"/>
+        </inkml:traceFormat>
+        <inkml:channelProperties>
+          <inkml:channelProperty channel="X" name="resolution" value="1000" units="1/cm"/>
+          <inkml:channelProperty channel="Y" name="resolution" value="1000" units="1/cm"/>
+        </inkml:channelProperties>
+      </inkml:inkSource>
+      <inkml:timestamp xml:id="ts0" timeString="2024-03-20T01:32:38.382"/>
+    </inkml:context>
+    <inkml:brush xml:id="br0">
+      <inkml:brushProperty name="width" value="0.05" units="cm"/>
+      <inkml:brushProperty name="height" value="0.05" units="cm"/>
+      <inkml:brushProperty name="color" value="#E71224"/>
+      <inkml:brushProperty name="ignorePressure" value="1"/>
+    </inkml:brush>
+  </inkml:definitions>
+  <inkml:trace contextRef="#ctx0" brushRef="#br0">930 1561,'0'-13,"0"-11,0-15,0-8,0-8,-13-16,-18-8,-17-18,-13-5,-11-6,-5-4,-10-9,-16-19,-5 3,3 4,13 11,16 27,20 29</inkml:trace>
+</inkml:ink>
+</file>
+
+<file path=ppt/ink/ink6.xml><?xml version="1.0" encoding="utf-8"?>
+<inkml:ink xmlns:inkml="http://www.w3.org/2003/InkML">
+  <inkml:definitions>
+    <inkml:context xml:id="ctx0">
+      <inkml:inkSource xml:id="inkSrc0">
+        <inkml:traceFormat>
+          <inkml:channel name="X" type="integer" min="-2.14748E9" max="2.14748E9" units="cm"/>
+          <inkml:channel name="Y" type="integer" min="-2.14748E9" max="2.14748E9" units="cm"/>
+        </inkml:traceFormat>
+        <inkml:channelProperties>
+          <inkml:channelProperty channel="X" name="resolution" value="1000" units="1/cm"/>
+          <inkml:channelProperty channel="Y" name="resolution" value="1000" units="1/cm"/>
+        </inkml:channelProperties>
+      </inkml:inkSource>
+      <inkml:timestamp xml:id="ts0" timeString="2024-03-20T01:32:43.653"/>
+    </inkml:context>
+    <inkml:brush xml:id="br0">
+      <inkml:brushProperty name="width" value="0.05" units="cm"/>
+      <inkml:brushProperty name="height" value="0.05" units="cm"/>
+      <inkml:brushProperty name="color" value="#E71224"/>
+      <inkml:brushProperty name="ignorePressure" value="1"/>
+    </inkml:brush>
+  </inkml:definitions>
+  <inkml:trace contextRef="#ctx0" brushRef="#br0">1 592,'13'0,"25"0,18 0,27 0,20 0,11 0,7-6,-4-16,17-24,14-31,-6-15,-20-6,-24 15,-23 13,-23 13,-21 17</inkml:trace>
+</inkml:ink>
+</file>
+
+<file path=ppt/ink/ink7.xml><?xml version="1.0" encoding="utf-8"?>
+<inkml:ink xmlns:inkml="http://www.w3.org/2003/InkML">
+  <inkml:definitions>
+    <inkml:context xml:id="ctx0">
+      <inkml:inkSource xml:id="inkSrc0">
+        <inkml:traceFormat>
+          <inkml:channel name="X" type="integer" min="-2.14748E9" max="2.14748E9" units="cm"/>
+          <inkml:channel name="Y" type="integer" min="-2.14748E9" max="2.14748E9" units="cm"/>
+        </inkml:traceFormat>
+        <inkml:channelProperties>
+          <inkml:channelProperty channel="X" name="resolution" value="1000" units="1/cm"/>
+          <inkml:channelProperty channel="Y" name="resolution" value="1000" units="1/cm"/>
+        </inkml:channelProperties>
+      </inkml:inkSource>
+      <inkml:timestamp xml:id="ts0" timeString="2024-03-20T01:32:44.354"/>
+    </inkml:context>
+    <inkml:brush xml:id="br0">
+      <inkml:brushProperty name="width" value="0.05" units="cm"/>
+      <inkml:brushProperty name="height" value="0.05" units="cm"/>
+      <inkml:brushProperty name="color" value="#E71224"/>
+      <inkml:brushProperty name="ignorePressure" value="1"/>
+    </inkml:brush>
+  </inkml:definitions>
+  <inkml:trace contextRef="#ctx0" brushRef="#br0">0 91,'109'2,"127"-5,-200 0,1-1,0-2,-1-2,46-16,-50 11,-17 6,-1 1,2 1,27-6,-40 10,0 0,-1 1,1 0,0 0,0-1,0 2,-1-1,1 0,0 0,0 1,-1 0,1 0,0-1,-1 1,1 1,-1-1,1 0,-1 1,0-1,1 1,-1 0,0-1,0 1,0 0,0 1,-1-1,3 3,1 6,0 0,-1 0,0 1,0-1,-2 1,1 0,-2 0,1 12,-2 105,-1-83,-4 91,0 110,10-196,4-11</inkml:trace>
+</inkml:ink>
+</file>
+
+<file path=ppt/ink/ink8.xml><?xml version="1.0" encoding="utf-8"?>
+<inkml:ink xmlns:inkml="http://www.w3.org/2003/InkML">
+  <inkml:definitions>
+    <inkml:context xml:id="ctx0">
+      <inkml:inkSource xml:id="inkSrc0">
+        <inkml:traceFormat>
+          <inkml:channel name="X" type="integer" min="-2.14748E9" max="2.14748E9" units="cm"/>
+          <inkml:channel name="Y" type="integer" min="-2.14748E9" max="2.14748E9" units="cm"/>
+        </inkml:traceFormat>
+        <inkml:channelProperties>
+          <inkml:channelProperty channel="X" name="resolution" value="1000" units="1/cm"/>
+          <inkml:channelProperty channel="Y" name="resolution" value="1000" units="1/cm"/>
+        </inkml:channelProperties>
+      </inkml:inkSource>
+      <inkml:timestamp xml:id="ts0" timeString="2024-03-20T01:32:45.029"/>
+    </inkml:context>
+    <inkml:brush xml:id="br0">
+      <inkml:brushProperty name="width" value="0.05" units="cm"/>
+      <inkml:brushProperty name="height" value="0.05" units="cm"/>
+      <inkml:brushProperty name="color" value="#E71224"/>
+      <inkml:brushProperty name="ignorePressure" value="1"/>
+    </inkml:brush>
+  </inkml:definitions>
+  <inkml:trace contextRef="#ctx0" brushRef="#br0">0 0,'10'38,"-2"-1,-1 2,1 44,1-2,13 141,-6 253,-16-466,0 0,0 0,1 0,0 0,0 0,5 15,-4-21,-1 0,1-1,-1 1,1 0,0-1,0 1,0-1,1 1,-1-1,1 0,-1 0,1 0,0-1,-1 1,1 0,0-1,0 0,0 0,0 0,0 0,1 0,2 0,14 2,0 0,1-2,-1 0,1-1,-1-1,0-1,1-1,-1-1,0-1,-1 0,1-1,29-15,-9 1,0-2,-2-2,0-1,56-51,-71 54,-5 1</inkml:trace>
+</inkml:ink>
+</file>
+
+<file path=ppt/ink/ink9.xml><?xml version="1.0" encoding="utf-8"?>
+<inkml:ink xmlns:inkml="http://www.w3.org/2003/InkML">
+  <inkml:definitions>
+    <inkml:context xml:id="ctx0">
+      <inkml:inkSource xml:id="inkSrc0">
+        <inkml:traceFormat>
+          <inkml:channel name="X" type="integer" min="-2.14748E9" max="2.14748E9" units="cm"/>
+          <inkml:channel name="Y" type="integer" min="-2.14748E9" max="2.14748E9" units="cm"/>
+        </inkml:traceFormat>
+        <inkml:channelProperties>
+          <inkml:channelProperty channel="X" name="resolution" value="1000" units="1/cm"/>
+          <inkml:channelProperty channel="Y" name="resolution" value="1000" units="1/cm"/>
+        </inkml:channelProperties>
+      </inkml:inkSource>
+      <inkml:timestamp xml:id="ts0" timeString="2024-03-20T01:32:45.828"/>
+    </inkml:context>
+    <inkml:brush xml:id="br0">
+      <inkml:brushProperty name="width" value="0.05" units="cm"/>
+      <inkml:brushProperty name="height" value="0.05" units="cm"/>
+      <inkml:brushProperty name="color" value="#E71224"/>
+      <inkml:brushProperty name="ignorePressure" value="1"/>
+    </inkml:brush>
+  </inkml:definitions>
+  <inkml:trace contextRef="#ctx0" brushRef="#br0">1 262,'30'84,"-24"-64,0 0,1-1,17 30,-22-44,1-1,0 1,0-1,1 0,-1 0,1-1,0 1,0-1,0 1,0-1,1-1,-1 1,1-1,-1 1,1-1,0-1,0 1,10 1,-12-2,1 0,0-1,0 0,-1 1,1-2,0 1,-1 0,1-1,0 1,-1-1,1 0,-1 0,1-1,-1 1,1-1,-1 0,0 0,0 0,4-3,-3 1,0-1,0 1,-1-1,1 0,-1 0,-1 0,1-1,-1 1,0-1,0 1,1-8,2-12,-1-1,-2 0,-1 0,-2-34,1 59,-1-41,1 14,-7-56,6 77,-1 1,1-1,-1 0,-1 0,1 1,-1-1,0 1,-1 0,1 0,-1 0,0 0,-1 1,-4-6,6 9,1 0,0 1,-1-1,1 0,-1 1,0 0,1-1,-1 1,0 0,0 1,0-1,0 0,0 1,0-1,0 1,0 0,0 0,0 0,0 1,0-1,0 1,1 0,-1-1,0 1,0 0,0 1,1-1,-1 0,0 1,1 0,-4 2,-8 7,1 0,1 1,0 0,-13 18,16-20,-28 34</inkml:trace>
+</inkml:ink>
 </file>
 
 <file path=ppt/slideLayouts/slideLayout1.xml><?xml version="1.0" encoding="utf-8"?>
@@ -3383,6 +3685,609 @@
           </a:p>
         </p:txBody>
       </p:sp>
+      <p:grpSp>
+        <p:nvGrpSpPr>
+          <p:cNvPr id="10" name="Group 9">
+            <a:extLst>
+              <a:ext uri="{FF2B5EF4-FFF2-40B4-BE49-F238E27FC236}">
+                <a16:creationId xmlns:a16="http://schemas.microsoft.com/office/drawing/2014/main" id="{B0EF2FEC-B058-47DB-9DE7-2AD981078FAE}"/>
+              </a:ext>
+            </a:extLst>
+          </p:cNvPr>
+          <p:cNvGrpSpPr/>
+          <p:nvPr/>
+        </p:nvGrpSpPr>
+        <p:grpSpPr>
+          <a:xfrm>
+            <a:off x="7490825" y="731963"/>
+            <a:ext cx="1314720" cy="1265760"/>
+            <a:chOff x="7490825" y="731963"/>
+            <a:chExt cx="1314720" cy="1265760"/>
+          </a:xfrm>
+        </p:grpSpPr>
+        <mc:AlternateContent xmlns:mc="http://schemas.openxmlformats.org/markup-compatibility/2006">
+          <mc:Choice xmlns:p14="http://schemas.microsoft.com/office/powerpoint/2010/main" Requires="p14">
+            <p:contentPart p14:bwMode="auto" r:id="rId2">
+              <p14:nvContentPartPr>
+                <p14:cNvPr id="5" name="Ink 4">
+                  <a:extLst>
+                    <a:ext uri="{FF2B5EF4-FFF2-40B4-BE49-F238E27FC236}">
+                      <a16:creationId xmlns:a16="http://schemas.microsoft.com/office/drawing/2014/main" id="{C34104F0-D365-43A0-9E84-CAB1738557A7}"/>
+                    </a:ext>
+                  </a:extLst>
+                </p14:cNvPr>
+                <p14:cNvContentPartPr/>
+                <p14:nvPr/>
+              </p14:nvContentPartPr>
+              <p14:xfrm>
+                <a:off x="8015345" y="1197803"/>
+                <a:ext cx="389520" cy="799920"/>
+              </p14:xfrm>
+            </p:contentPart>
+          </mc:Choice>
+          <mc:Fallback>
+            <p:pic>
+              <p:nvPicPr>
+                <p:cNvPr id="5" name="Ink 4">
+                  <a:extLst>
+                    <a:ext uri="{FF2B5EF4-FFF2-40B4-BE49-F238E27FC236}">
+                      <a16:creationId xmlns:a16="http://schemas.microsoft.com/office/drawing/2014/main" id="{C34104F0-D365-43A0-9E84-CAB1738557A7}"/>
+                    </a:ext>
+                  </a:extLst>
+                </p:cNvPr>
+                <p:cNvPicPr/>
+                <p:nvPr/>
+              </p:nvPicPr>
+              <p:blipFill>
+                <a:blip r:embed="rId3"/>
+                <a:stretch>
+                  <a:fillRect/>
+                </a:stretch>
+              </p:blipFill>
+              <p:spPr>
+                <a:xfrm>
+                  <a:off x="8006705" y="1188803"/>
+                  <a:ext cx="407160" cy="817560"/>
+                </a:xfrm>
+                <a:prstGeom prst="rect">
+                  <a:avLst/>
+                </a:prstGeom>
+              </p:spPr>
+            </p:pic>
+          </mc:Fallback>
+        </mc:AlternateContent>
+        <mc:AlternateContent xmlns:mc="http://schemas.openxmlformats.org/markup-compatibility/2006">
+          <mc:Choice xmlns:p14="http://schemas.microsoft.com/office/powerpoint/2010/main" Requires="p14">
+            <p:contentPart p14:bwMode="auto" r:id="rId4">
+              <p14:nvContentPartPr>
+                <p14:cNvPr id="6" name="Ink 5">
+                  <a:extLst>
+                    <a:ext uri="{FF2B5EF4-FFF2-40B4-BE49-F238E27FC236}">
+                      <a16:creationId xmlns:a16="http://schemas.microsoft.com/office/drawing/2014/main" id="{FE808535-487C-4BFB-BD71-E5F748C6FE76}"/>
+                    </a:ext>
+                  </a:extLst>
+                </p14:cNvPr>
+                <p14:cNvContentPartPr/>
+                <p14:nvPr/>
+              </p14:nvContentPartPr>
+              <p14:xfrm>
+                <a:off x="7490825" y="1179803"/>
+                <a:ext cx="640440" cy="624240"/>
+              </p14:xfrm>
+            </p:contentPart>
+          </mc:Choice>
+          <mc:Fallback>
+            <p:pic>
+              <p:nvPicPr>
+                <p:cNvPr id="6" name="Ink 5">
+                  <a:extLst>
+                    <a:ext uri="{FF2B5EF4-FFF2-40B4-BE49-F238E27FC236}">
+                      <a16:creationId xmlns:a16="http://schemas.microsoft.com/office/drawing/2014/main" id="{FE808535-487C-4BFB-BD71-E5F748C6FE76}"/>
+                    </a:ext>
+                  </a:extLst>
+                </p:cNvPr>
+                <p:cNvPicPr/>
+                <p:nvPr/>
+              </p:nvPicPr>
+              <p:blipFill>
+                <a:blip r:embed="rId5"/>
+                <a:stretch>
+                  <a:fillRect/>
+                </a:stretch>
+              </p:blipFill>
+              <p:spPr>
+                <a:xfrm>
+                  <a:off x="7481825" y="1170803"/>
+                  <a:ext cx="658080" cy="641880"/>
+                </a:xfrm>
+                <a:prstGeom prst="rect">
+                  <a:avLst/>
+                </a:prstGeom>
+              </p:spPr>
+            </p:pic>
+          </mc:Fallback>
+        </mc:AlternateContent>
+        <mc:AlternateContent xmlns:mc="http://schemas.openxmlformats.org/markup-compatibility/2006">
+          <mc:Choice xmlns:p14="http://schemas.microsoft.com/office/powerpoint/2010/main" Requires="p14">
+            <p:contentPart p14:bwMode="auto" r:id="rId6">
+              <p14:nvContentPartPr>
+                <p14:cNvPr id="7" name="Ink 6">
+                  <a:extLst>
+                    <a:ext uri="{FF2B5EF4-FFF2-40B4-BE49-F238E27FC236}">
+                      <a16:creationId xmlns:a16="http://schemas.microsoft.com/office/drawing/2014/main" id="{E7E5040E-8E0B-4F8D-93F2-9B6E2144F462}"/>
+                    </a:ext>
+                  </a:extLst>
+                </p14:cNvPr>
+                <p14:cNvContentPartPr/>
+                <p14:nvPr/>
+              </p14:nvContentPartPr>
+              <p14:xfrm>
+                <a:off x="8241785" y="1221563"/>
+                <a:ext cx="563760" cy="596160"/>
+              </p14:xfrm>
+            </p:contentPart>
+          </mc:Choice>
+          <mc:Fallback>
+            <p:pic>
+              <p:nvPicPr>
+                <p:cNvPr id="7" name="Ink 6">
+                  <a:extLst>
+                    <a:ext uri="{FF2B5EF4-FFF2-40B4-BE49-F238E27FC236}">
+                      <a16:creationId xmlns:a16="http://schemas.microsoft.com/office/drawing/2014/main" id="{E7E5040E-8E0B-4F8D-93F2-9B6E2144F462}"/>
+                    </a:ext>
+                  </a:extLst>
+                </p:cNvPr>
+                <p:cNvPicPr/>
+                <p:nvPr/>
+              </p:nvPicPr>
+              <p:blipFill>
+                <a:blip r:embed="rId7"/>
+                <a:stretch>
+                  <a:fillRect/>
+                </a:stretch>
+              </p:blipFill>
+              <p:spPr>
+                <a:xfrm>
+                  <a:off x="8233145" y="1212563"/>
+                  <a:ext cx="581400" cy="613800"/>
+                </a:xfrm>
+                <a:prstGeom prst="rect">
+                  <a:avLst/>
+                </a:prstGeom>
+              </p:spPr>
+            </p:pic>
+          </mc:Fallback>
+        </mc:AlternateContent>
+        <mc:AlternateContent xmlns:mc="http://schemas.openxmlformats.org/markup-compatibility/2006">
+          <mc:Choice xmlns:p14="http://schemas.microsoft.com/office/powerpoint/2010/main" Requires="p14">
+            <p:contentPart p14:bwMode="auto" r:id="rId8">
+              <p14:nvContentPartPr>
+                <p14:cNvPr id="8" name="Ink 7">
+                  <a:extLst>
+                    <a:ext uri="{FF2B5EF4-FFF2-40B4-BE49-F238E27FC236}">
+                      <a16:creationId xmlns:a16="http://schemas.microsoft.com/office/drawing/2014/main" id="{A7300453-FEE4-4F16-8C9A-51F6224249DD}"/>
+                    </a:ext>
+                  </a:extLst>
+                </p14:cNvPr>
+                <p14:cNvContentPartPr/>
+                <p14:nvPr/>
+              </p14:nvContentPartPr>
+              <p14:xfrm>
+                <a:off x="8284985" y="788483"/>
+                <a:ext cx="169920" cy="491760"/>
+              </p14:xfrm>
+            </p:contentPart>
+          </mc:Choice>
+          <mc:Fallback>
+            <p:pic>
+              <p:nvPicPr>
+                <p:cNvPr id="8" name="Ink 7">
+                  <a:extLst>
+                    <a:ext uri="{FF2B5EF4-FFF2-40B4-BE49-F238E27FC236}">
+                      <a16:creationId xmlns:a16="http://schemas.microsoft.com/office/drawing/2014/main" id="{A7300453-FEE4-4F16-8C9A-51F6224249DD}"/>
+                    </a:ext>
+                  </a:extLst>
+                </p:cNvPr>
+                <p:cNvPicPr/>
+                <p:nvPr/>
+              </p:nvPicPr>
+              <p:blipFill>
+                <a:blip r:embed="rId9"/>
+                <a:stretch>
+                  <a:fillRect/>
+                </a:stretch>
+              </p:blipFill>
+              <p:spPr>
+                <a:xfrm>
+                  <a:off x="8276345" y="779483"/>
+                  <a:ext cx="187560" cy="509400"/>
+                </a:xfrm>
+                <a:prstGeom prst="rect">
+                  <a:avLst/>
+                </a:prstGeom>
+              </p:spPr>
+            </p:pic>
+          </mc:Fallback>
+        </mc:AlternateContent>
+        <mc:AlternateContent xmlns:mc="http://schemas.openxmlformats.org/markup-compatibility/2006">
+          <mc:Choice xmlns:p14="http://schemas.microsoft.com/office/powerpoint/2010/main" Requires="p14">
+            <p:contentPart p14:bwMode="auto" r:id="rId10">
+              <p14:nvContentPartPr>
+                <p14:cNvPr id="9" name="Ink 8">
+                  <a:extLst>
+                    <a:ext uri="{FF2B5EF4-FFF2-40B4-BE49-F238E27FC236}">
+                      <a16:creationId xmlns:a16="http://schemas.microsoft.com/office/drawing/2014/main" id="{6BC89A5C-3D65-4C44-800D-1742F2F9EEF6}"/>
+                    </a:ext>
+                  </a:extLst>
+                </p14:cNvPr>
+                <p14:cNvContentPartPr/>
+                <p14:nvPr/>
+              </p14:nvContentPartPr>
+              <p14:xfrm>
+                <a:off x="7796105" y="731963"/>
+                <a:ext cx="335160" cy="562320"/>
+              </p14:xfrm>
+            </p:contentPart>
+          </mc:Choice>
+          <mc:Fallback>
+            <p:pic>
+              <p:nvPicPr>
+                <p:cNvPr id="9" name="Ink 8">
+                  <a:extLst>
+                    <a:ext uri="{FF2B5EF4-FFF2-40B4-BE49-F238E27FC236}">
+                      <a16:creationId xmlns:a16="http://schemas.microsoft.com/office/drawing/2014/main" id="{6BC89A5C-3D65-4C44-800D-1742F2F9EEF6}"/>
+                    </a:ext>
+                  </a:extLst>
+                </p:cNvPr>
+                <p:cNvPicPr/>
+                <p:nvPr/>
+              </p:nvPicPr>
+              <p:blipFill>
+                <a:blip r:embed="rId11"/>
+                <a:stretch>
+                  <a:fillRect/>
+                </a:stretch>
+              </p:blipFill>
+              <p:spPr>
+                <a:xfrm>
+                  <a:off x="7787465" y="722963"/>
+                  <a:ext cx="352800" cy="579960"/>
+                </a:xfrm>
+                <a:prstGeom prst="rect">
+                  <a:avLst/>
+                </a:prstGeom>
+              </p:spPr>
+            </p:pic>
+          </mc:Fallback>
+        </mc:AlternateContent>
+      </p:grpSp>
+      <p:grpSp>
+        <p:nvGrpSpPr>
+          <p:cNvPr id="17" name="Group 16">
+            <a:extLst>
+              <a:ext uri="{FF2B5EF4-FFF2-40B4-BE49-F238E27FC236}">
+                <a16:creationId xmlns:a16="http://schemas.microsoft.com/office/drawing/2014/main" id="{8F65F794-AB86-444C-99E8-AB690365F1E6}"/>
+              </a:ext>
+            </a:extLst>
+          </p:cNvPr>
+          <p:cNvGrpSpPr/>
+          <p:nvPr/>
+        </p:nvGrpSpPr>
+        <p:grpSpPr>
+          <a:xfrm>
+            <a:off x="9058985" y="826643"/>
+            <a:ext cx="2115000" cy="1114560"/>
+            <a:chOff x="9058985" y="826643"/>
+            <a:chExt cx="2115000" cy="1114560"/>
+          </a:xfrm>
+        </p:grpSpPr>
+        <mc:AlternateContent xmlns:mc="http://schemas.openxmlformats.org/markup-compatibility/2006">
+          <mc:Choice xmlns:p14="http://schemas.microsoft.com/office/powerpoint/2010/main" Requires="p14">
+            <p:contentPart p14:bwMode="auto" r:id="rId12">
+              <p14:nvContentPartPr>
+                <p14:cNvPr id="11" name="Ink 10">
+                  <a:extLst>
+                    <a:ext uri="{FF2B5EF4-FFF2-40B4-BE49-F238E27FC236}">
+                      <a16:creationId xmlns:a16="http://schemas.microsoft.com/office/drawing/2014/main" id="{72AF5234-24C5-4786-891E-09F6AD9C56F6}"/>
+                    </a:ext>
+                  </a:extLst>
+                </p14:cNvPr>
+                <p14:cNvContentPartPr/>
+                <p14:nvPr/>
+              </p14:nvContentPartPr>
+              <p14:xfrm>
+                <a:off x="9058985" y="1727723"/>
+                <a:ext cx="521280" cy="213480"/>
+              </p14:xfrm>
+            </p:contentPart>
+          </mc:Choice>
+          <mc:Fallback>
+            <p:pic>
+              <p:nvPicPr>
+                <p:cNvPr id="11" name="Ink 10">
+                  <a:extLst>
+                    <a:ext uri="{FF2B5EF4-FFF2-40B4-BE49-F238E27FC236}">
+                      <a16:creationId xmlns:a16="http://schemas.microsoft.com/office/drawing/2014/main" id="{72AF5234-24C5-4786-891E-09F6AD9C56F6}"/>
+                    </a:ext>
+                  </a:extLst>
+                </p:cNvPr>
+                <p:cNvPicPr/>
+                <p:nvPr/>
+              </p:nvPicPr>
+              <p:blipFill>
+                <a:blip r:embed="rId13"/>
+                <a:stretch>
+                  <a:fillRect/>
+                </a:stretch>
+              </p:blipFill>
+              <p:spPr>
+                <a:xfrm>
+                  <a:off x="9050345" y="1719083"/>
+                  <a:ext cx="538920" cy="231120"/>
+                </a:xfrm>
+                <a:prstGeom prst="rect">
+                  <a:avLst/>
+                </a:prstGeom>
+              </p:spPr>
+            </p:pic>
+          </mc:Fallback>
+        </mc:AlternateContent>
+        <mc:AlternateContent xmlns:mc="http://schemas.openxmlformats.org/markup-compatibility/2006">
+          <mc:Choice xmlns:p14="http://schemas.microsoft.com/office/powerpoint/2010/main" Requires="p14">
+            <p:contentPart p14:bwMode="auto" r:id="rId14">
+              <p14:nvContentPartPr>
+                <p14:cNvPr id="12" name="Ink 11">
+                  <a:extLst>
+                    <a:ext uri="{FF2B5EF4-FFF2-40B4-BE49-F238E27FC236}">
+                      <a16:creationId xmlns:a16="http://schemas.microsoft.com/office/drawing/2014/main" id="{79F36496-CA50-4AE8-B920-F7CCFBD770D0}"/>
+                    </a:ext>
+                  </a:extLst>
+                </p14:cNvPr>
+                <p14:cNvContentPartPr/>
+                <p14:nvPr/>
+              </p14:nvContentPartPr>
+              <p14:xfrm>
+                <a:off x="9425105" y="1584803"/>
+                <a:ext cx="287280" cy="286920"/>
+              </p14:xfrm>
+            </p:contentPart>
+          </mc:Choice>
+          <mc:Fallback>
+            <p:pic>
+              <p:nvPicPr>
+                <p:cNvPr id="12" name="Ink 11">
+                  <a:extLst>
+                    <a:ext uri="{FF2B5EF4-FFF2-40B4-BE49-F238E27FC236}">
+                      <a16:creationId xmlns:a16="http://schemas.microsoft.com/office/drawing/2014/main" id="{79F36496-CA50-4AE8-B920-F7CCFBD770D0}"/>
+                    </a:ext>
+                  </a:extLst>
+                </p:cNvPr>
+                <p:cNvPicPr/>
+                <p:nvPr/>
+              </p:nvPicPr>
+              <p:blipFill>
+                <a:blip r:embed="rId15"/>
+                <a:stretch>
+                  <a:fillRect/>
+                </a:stretch>
+              </p:blipFill>
+              <p:spPr>
+                <a:xfrm>
+                  <a:off x="9416105" y="1575803"/>
+                  <a:ext cx="304920" cy="304560"/>
+                </a:xfrm>
+                <a:prstGeom prst="rect">
+                  <a:avLst/>
+                </a:prstGeom>
+              </p:spPr>
+            </p:pic>
+          </mc:Fallback>
+        </mc:AlternateContent>
+        <mc:AlternateContent xmlns:mc="http://schemas.openxmlformats.org/markup-compatibility/2006">
+          <mc:Choice xmlns:p14="http://schemas.microsoft.com/office/powerpoint/2010/main" Requires="p14">
+            <p:contentPart p14:bwMode="auto" r:id="rId16">
+              <p14:nvContentPartPr>
+                <p14:cNvPr id="13" name="Ink 12">
+                  <a:extLst>
+                    <a:ext uri="{FF2B5EF4-FFF2-40B4-BE49-F238E27FC236}">
+                      <a16:creationId xmlns:a16="http://schemas.microsoft.com/office/drawing/2014/main" id="{7126DB8B-E9C2-4388-BB6F-FB421ADCC469}"/>
+                    </a:ext>
+                  </a:extLst>
+                </p14:cNvPr>
+                <p14:cNvContentPartPr/>
+                <p14:nvPr/>
+              </p14:nvContentPartPr>
+              <p14:xfrm>
+                <a:off x="9875465" y="1026443"/>
+                <a:ext cx="263520" cy="398160"/>
+              </p14:xfrm>
+            </p:contentPart>
+          </mc:Choice>
+          <mc:Fallback>
+            <p:pic>
+              <p:nvPicPr>
+                <p:cNvPr id="13" name="Ink 12">
+                  <a:extLst>
+                    <a:ext uri="{FF2B5EF4-FFF2-40B4-BE49-F238E27FC236}">
+                      <a16:creationId xmlns:a16="http://schemas.microsoft.com/office/drawing/2014/main" id="{7126DB8B-E9C2-4388-BB6F-FB421ADCC469}"/>
+                    </a:ext>
+                  </a:extLst>
+                </p:cNvPr>
+                <p:cNvPicPr/>
+                <p:nvPr/>
+              </p:nvPicPr>
+              <p:blipFill>
+                <a:blip r:embed="rId17"/>
+                <a:stretch>
+                  <a:fillRect/>
+                </a:stretch>
+              </p:blipFill>
+              <p:spPr>
+                <a:xfrm>
+                  <a:off x="9866465" y="1017443"/>
+                  <a:ext cx="281160" cy="415800"/>
+                </a:xfrm>
+                <a:prstGeom prst="rect">
+                  <a:avLst/>
+                </a:prstGeom>
+              </p:spPr>
+            </p:pic>
+          </mc:Fallback>
+        </mc:AlternateContent>
+        <mc:AlternateContent xmlns:mc="http://schemas.openxmlformats.org/markup-compatibility/2006">
+          <mc:Choice xmlns:p14="http://schemas.microsoft.com/office/powerpoint/2010/main" Requires="p14">
+            <p:contentPart p14:bwMode="auto" r:id="rId18">
+              <p14:nvContentPartPr>
+                <p14:cNvPr id="14" name="Ink 13">
+                  <a:extLst>
+                    <a:ext uri="{FF2B5EF4-FFF2-40B4-BE49-F238E27FC236}">
+                      <a16:creationId xmlns:a16="http://schemas.microsoft.com/office/drawing/2014/main" id="{F75E22A3-B5FC-4011-A50B-7EE003D7EDCB}"/>
+                    </a:ext>
+                  </a:extLst>
+                </p14:cNvPr>
+                <p14:cNvContentPartPr/>
+                <p14:nvPr/>
+              </p14:nvContentPartPr>
+              <p14:xfrm>
+                <a:off x="10254905" y="1115003"/>
+                <a:ext cx="101880" cy="186480"/>
+              </p14:xfrm>
+            </p:contentPart>
+          </mc:Choice>
+          <mc:Fallback>
+            <p:pic>
+              <p:nvPicPr>
+                <p:cNvPr id="14" name="Ink 13">
+                  <a:extLst>
+                    <a:ext uri="{FF2B5EF4-FFF2-40B4-BE49-F238E27FC236}">
+                      <a16:creationId xmlns:a16="http://schemas.microsoft.com/office/drawing/2014/main" id="{F75E22A3-B5FC-4011-A50B-7EE003D7EDCB}"/>
+                    </a:ext>
+                  </a:extLst>
+                </p:cNvPr>
+                <p:cNvPicPr/>
+                <p:nvPr/>
+              </p:nvPicPr>
+              <p:blipFill>
+                <a:blip r:embed="rId19"/>
+                <a:stretch>
+                  <a:fillRect/>
+                </a:stretch>
+              </p:blipFill>
+              <p:spPr>
+                <a:xfrm>
+                  <a:off x="10246265" y="1106003"/>
+                  <a:ext cx="119520" cy="204120"/>
+                </a:xfrm>
+                <a:prstGeom prst="rect">
+                  <a:avLst/>
+                </a:prstGeom>
+              </p:spPr>
+            </p:pic>
+          </mc:Fallback>
+        </mc:AlternateContent>
+        <mc:AlternateContent xmlns:mc="http://schemas.openxmlformats.org/markup-compatibility/2006">
+          <mc:Choice xmlns:p14="http://schemas.microsoft.com/office/powerpoint/2010/main" Requires="p14">
+            <p:contentPart p14:bwMode="auto" r:id="rId20">
+              <p14:nvContentPartPr>
+                <p14:cNvPr id="15" name="Ink 14">
+                  <a:extLst>
+                    <a:ext uri="{FF2B5EF4-FFF2-40B4-BE49-F238E27FC236}">
+                      <a16:creationId xmlns:a16="http://schemas.microsoft.com/office/drawing/2014/main" id="{5819E81B-D105-4210-9E1A-5515F0C4BED0}"/>
+                    </a:ext>
+                  </a:extLst>
+                </p14:cNvPr>
+                <p14:cNvContentPartPr/>
+                <p14:nvPr/>
+              </p14:nvContentPartPr>
+              <p14:xfrm>
+                <a:off x="10555505" y="1023923"/>
+                <a:ext cx="254160" cy="171000"/>
+              </p14:xfrm>
+            </p:contentPart>
+          </mc:Choice>
+          <mc:Fallback>
+            <p:pic>
+              <p:nvPicPr>
+                <p:cNvPr id="15" name="Ink 14">
+                  <a:extLst>
+                    <a:ext uri="{FF2B5EF4-FFF2-40B4-BE49-F238E27FC236}">
+                      <a16:creationId xmlns:a16="http://schemas.microsoft.com/office/drawing/2014/main" id="{5819E81B-D105-4210-9E1A-5515F0C4BED0}"/>
+                    </a:ext>
+                  </a:extLst>
+                </p:cNvPr>
+                <p:cNvPicPr/>
+                <p:nvPr/>
+              </p:nvPicPr>
+              <p:blipFill>
+                <a:blip r:embed="rId21"/>
+                <a:stretch>
+                  <a:fillRect/>
+                </a:stretch>
+              </p:blipFill>
+              <p:spPr>
+                <a:xfrm>
+                  <a:off x="10546505" y="1015283"/>
+                  <a:ext cx="271800" cy="188640"/>
+                </a:xfrm>
+                <a:prstGeom prst="rect">
+                  <a:avLst/>
+                </a:prstGeom>
+              </p:spPr>
+            </p:pic>
+          </mc:Fallback>
+        </mc:AlternateContent>
+        <mc:AlternateContent xmlns:mc="http://schemas.openxmlformats.org/markup-compatibility/2006">
+          <mc:Choice xmlns:p14="http://schemas.microsoft.com/office/powerpoint/2010/main" Requires="p14">
+            <p:contentPart p14:bwMode="auto" r:id="rId22">
+              <p14:nvContentPartPr>
+                <p14:cNvPr id="16" name="Ink 15">
+                  <a:extLst>
+                    <a:ext uri="{FF2B5EF4-FFF2-40B4-BE49-F238E27FC236}">
+                      <a16:creationId xmlns:a16="http://schemas.microsoft.com/office/drawing/2014/main" id="{E258B171-2840-49B3-88FD-CF8CC4AC56A1}"/>
+                    </a:ext>
+                  </a:extLst>
+                </p14:cNvPr>
+                <p14:cNvContentPartPr/>
+                <p14:nvPr/>
+              </p14:nvContentPartPr>
+              <p14:xfrm>
+                <a:off x="10897505" y="826643"/>
+                <a:ext cx="276480" cy="246960"/>
+              </p14:xfrm>
+            </p:contentPart>
+          </mc:Choice>
+          <mc:Fallback>
+            <p:pic>
+              <p:nvPicPr>
+                <p:cNvPr id="16" name="Ink 15">
+                  <a:extLst>
+                    <a:ext uri="{FF2B5EF4-FFF2-40B4-BE49-F238E27FC236}">
+                      <a16:creationId xmlns:a16="http://schemas.microsoft.com/office/drawing/2014/main" id="{E258B171-2840-49B3-88FD-CF8CC4AC56A1}"/>
+                    </a:ext>
+                  </a:extLst>
+                </p:cNvPr>
+                <p:cNvPicPr/>
+                <p:nvPr/>
+              </p:nvPicPr>
+              <p:blipFill>
+                <a:blip r:embed="rId23"/>
+                <a:stretch>
+                  <a:fillRect/>
+                </a:stretch>
+              </p:blipFill>
+              <p:spPr>
+                <a:xfrm>
+                  <a:off x="10888865" y="818003"/>
+                  <a:ext cx="294120" cy="264600"/>
+                </a:xfrm>
+                <a:prstGeom prst="rect">
+                  <a:avLst/>
+                </a:prstGeom>
+              </p:spPr>
+            </p:pic>
+          </mc:Fallback>
+        </mc:AlternateContent>
+      </p:grpSp>
     </p:spTree>
     <p:extLst>
       <p:ext uri="{BB962C8B-B14F-4D97-AF65-F5344CB8AC3E}">

</xml_diff>